<commit_message>
fix: translate Portuguese to English
</commit_message>
<xml_diff>
--- a/internal-offering-evolution.pptx
+++ b/internal-offering-evolution.pptx
@@ -12614,7 +12614,7 @@
                 <a:ea typeface="Calibri" pitchFamily="34" charset="-122"/>
                 <a:cs typeface="Calibri" pitchFamily="34" charset="-120"/>
               </a:rPr>
-              <a:t>PHASE 1  ·  1º SEM 2026</a:t>
+              <a:t>PHASE 1  ·  FIRST HALF 2026</a:t>
             </a:r>
             <a:endParaRPr lang="en-US" sz="800" dirty="0"/>
           </a:p>
@@ -13054,7 +13054,7 @@
                 <a:ea typeface="Calibri" pitchFamily="34" charset="-122"/>
                 <a:cs typeface="Calibri" pitchFamily="34" charset="-120"/>
               </a:rPr>
-              <a:t>PHASE 2  ·  2º SEM 2026</a:t>
+              <a:t>PHASE 2  ·  SECOND HALF 2026</a:t>
             </a:r>
             <a:endParaRPr lang="en-US" sz="800" dirty="0"/>
           </a:p>

</xml_diff>